<commit_message>
More PPT updates, plus logos
</commit_message>
<xml_diff>
--- a/presentation/AngelHack 2019 Slides.pptx
+++ b/presentation/AngelHack 2019 Slides.pptx
@@ -9,6 +9,7 @@
     <p:sldId id="259" r:id="rId3"/>
     <p:sldId id="260" r:id="rId4"/>
     <p:sldId id="261" r:id="rId5"/>
+    <p:sldId id="262" r:id="rId6"/>
   </p:sldIdLst>
   <p:sldSz cx="12192000" cy="6858000"/>
   <p:notesSz cx="6858000" cy="9144000"/>
@@ -12287,19 +12288,19 @@
         </p:nvSpPr>
         <p:spPr>
           <a:xfrm>
-            <a:off x="-421" y="2538712"/>
-            <a:ext cx="5207219" cy="1622321"/>
+            <a:off x="-420" y="2898481"/>
+            <a:ext cx="5207219" cy="1036695"/>
           </a:xfrm>
         </p:spPr>
         <p:txBody>
           <a:bodyPr vert="horz" lIns="91440" tIns="45720" rIns="91440" bIns="45720" rtlCol="0">
-            <a:normAutofit/>
+            <a:noAutofit/>
           </a:bodyPr>
           <a:lstStyle/>
           <a:p>
             <a:pPr algn="ctr"/>
             <a:r>
-              <a:rPr lang="en-US" sz="6000" b="0" i="0" kern="1200" dirty="0">
+              <a:rPr lang="en-US" sz="6600" b="0" i="0" kern="1200" dirty="0">
                 <a:solidFill>
                   <a:srgbClr val="EBEBEB"/>
                 </a:solidFill>
@@ -13227,8 +13228,8 @@
         </p:nvSpPr>
         <p:spPr>
           <a:xfrm>
-            <a:off x="0" y="3575407"/>
-            <a:ext cx="5206798" cy="2062785"/>
+            <a:off x="1" y="3935177"/>
+            <a:ext cx="5206798" cy="585626"/>
           </a:xfrm>
           <a:prstGeom prst="rect">
             <a:avLst/>
@@ -13470,7 +13471,7 @@
               <a:buNone/>
             </a:pPr>
             <a:r>
-              <a:rPr lang="en-US" i="1" dirty="0">
+              <a:rPr lang="en-US" sz="2400" i="1" dirty="0">
                 <a:solidFill>
                   <a:srgbClr val="EBEBEB"/>
                 </a:solidFill>
@@ -13480,6 +13481,36 @@
           </a:p>
         </p:txBody>
       </p:sp>
+      <p:pic>
+        <p:nvPicPr>
+          <p:cNvPr id="25" name="Picture 24" descr="A close up of a logo&#10;&#10;Description automatically generated">
+            <a:extLst>
+              <a:ext uri="{FF2B5EF4-FFF2-40B4-BE49-F238E27FC236}">
+                <a16:creationId xmlns:a16="http://schemas.microsoft.com/office/drawing/2014/main" id="{221ABCDB-C538-A74C-9843-9933208CDED6}"/>
+              </a:ext>
+            </a:extLst>
+          </p:cNvPr>
+          <p:cNvPicPr>
+            <a:picLocks noChangeAspect="1"/>
+          </p:cNvPicPr>
+          <p:nvPr/>
+        </p:nvPicPr>
+        <p:blipFill>
+          <a:blip r:embed="rId3"/>
+          <a:stretch>
+            <a:fillRect/>
+          </a:stretch>
+        </p:blipFill>
+        <p:spPr>
+          <a:xfrm>
+            <a:off x="1776310" y="1619983"/>
+            <a:ext cx="1440561" cy="1278498"/>
+          </a:xfrm>
+          <a:prstGeom prst="rect">
+            <a:avLst/>
+          </a:prstGeom>
+        </p:spPr>
+      </p:pic>
     </p:spTree>
     <p:extLst>
       <p:ext uri="{BB962C8B-B14F-4D97-AF65-F5344CB8AC3E}">
@@ -15662,6 +15693,1387 @@
 <file path=ppt/slides/slide4.xml><?xml version="1.0" encoding="utf-8"?>
 <p:sld xmlns:a="http://schemas.openxmlformats.org/drawingml/2006/main" xmlns:r="http://schemas.openxmlformats.org/officeDocument/2006/relationships" xmlns:p="http://schemas.openxmlformats.org/presentationml/2006/main">
   <p:cSld>
+    <p:bg>
+      <p:bgPr>
+        <a:solidFill>
+          <a:schemeClr val="bg1"/>
+        </a:solidFill>
+        <a:effectLst/>
+      </p:bgPr>
+    </p:bg>
+    <p:spTree>
+      <p:nvGrpSpPr>
+        <p:cNvPr id="1" name=""/>
+        <p:cNvGrpSpPr/>
+        <p:nvPr/>
+      </p:nvGrpSpPr>
+      <p:grpSpPr>
+        <a:xfrm>
+          <a:off x="0" y="0"/>
+          <a:ext cx="0" cy="0"/>
+          <a:chOff x="0" y="0"/>
+          <a:chExt cx="0" cy="0"/>
+        </a:xfrm>
+      </p:grpSpPr>
+      <p:pic>
+        <p:nvPicPr>
+          <p:cNvPr id="11" name="Picture 10">
+            <a:extLst>
+              <a:ext uri="{FF2B5EF4-FFF2-40B4-BE49-F238E27FC236}">
+                <a16:creationId xmlns:a16="http://schemas.microsoft.com/office/drawing/2014/main" id="{41B68C77-138E-4BF7-A276-BD0C78A4219F}"/>
+              </a:ext>
+              <a:ext uri="{C183D7F6-B498-43B3-948B-1728B52AA6E4}">
+                <adec:decorative xmlns:adec="http://schemas.microsoft.com/office/drawing/2017/decorative" val="1"/>
+              </a:ext>
+            </a:extLst>
+          </p:cNvPr>
+          <p:cNvPicPr>
+            <a:picLocks noGrp="1" noRot="1" noChangeAspect="1" noMove="1" noResize="1" noEditPoints="1" noAdjustHandles="1" noChangeArrowheads="1" noChangeShapeType="1" noCrop="1"/>
+          </p:cNvPicPr>
+          <p:nvPr>
+            <p:extLst>
+              <p:ext uri="{386F3935-93C4-4BCD-93E2-E3B085C9AB24}">
+                <p16:designElem xmlns:p16="http://schemas.microsoft.com/office/powerpoint/2015/main" val="1"/>
+              </p:ext>
+            </p:extLst>
+          </p:nvPr>
+        </p:nvPicPr>
+        <p:blipFill rotWithShape="1">
+          <a:blip r:embed="rId2">
+            <a:extLst>
+              <a:ext uri="{28A0092B-C50C-407E-A947-70E740481C1C}">
+                <a14:useLocalDpi xmlns:a14="http://schemas.microsoft.com/office/drawing/2010/main" val="0"/>
+              </a:ext>
+            </a:extLst>
+          </a:blip>
+          <a:srcRect l="3613"/>
+          <a:stretch/>
+        </p:blipFill>
+        <p:spPr>
+          <a:xfrm>
+            <a:off x="0" y="2669685"/>
+            <a:ext cx="4037012" cy="4188315"/>
+          </a:xfrm>
+          <a:prstGeom prst="rect">
+            <a:avLst/>
+          </a:prstGeom>
+        </p:spPr>
+      </p:pic>
+      <p:pic>
+        <p:nvPicPr>
+          <p:cNvPr id="13" name="Picture 12">
+            <a:extLst>
+              <a:ext uri="{FF2B5EF4-FFF2-40B4-BE49-F238E27FC236}">
+                <a16:creationId xmlns:a16="http://schemas.microsoft.com/office/drawing/2014/main" id="{7C268552-D473-46ED-B1B8-422042C4DEF1}"/>
+              </a:ext>
+              <a:ext uri="{C183D7F6-B498-43B3-948B-1728B52AA6E4}">
+                <adec:decorative xmlns:adec="http://schemas.microsoft.com/office/drawing/2017/decorative" val="1"/>
+              </a:ext>
+            </a:extLst>
+          </p:cNvPr>
+          <p:cNvPicPr>
+            <a:picLocks noGrp="1" noRot="1" noChangeAspect="1" noMove="1" noResize="1" noEditPoints="1" noAdjustHandles="1" noChangeArrowheads="1" noChangeShapeType="1" noCrop="1"/>
+          </p:cNvPicPr>
+          <p:nvPr>
+            <p:extLst>
+              <p:ext uri="{386F3935-93C4-4BCD-93E2-E3B085C9AB24}">
+                <p16:designElem xmlns:p16="http://schemas.microsoft.com/office/powerpoint/2015/main" val="1"/>
+              </p:ext>
+            </p:extLst>
+          </p:nvPr>
+        </p:nvPicPr>
+        <p:blipFill rotWithShape="1">
+          <a:blip r:embed="rId3">
+            <a:extLst>
+              <a:ext uri="{28A0092B-C50C-407E-A947-70E740481C1C}">
+                <a14:useLocalDpi xmlns:a14="http://schemas.microsoft.com/office/drawing/2010/main" val="0"/>
+              </a:ext>
+            </a:extLst>
+          </a:blip>
+          <a:srcRect l="35640"/>
+          <a:stretch/>
+        </p:blipFill>
+        <p:spPr>
+          <a:xfrm>
+            <a:off x="0" y="2892347"/>
+            <a:ext cx="1522412" cy="2365453"/>
+          </a:xfrm>
+          <a:prstGeom prst="rect">
+            <a:avLst/>
+          </a:prstGeom>
+        </p:spPr>
+      </p:pic>
+      <p:sp>
+        <p:nvSpPr>
+          <p:cNvPr id="15" name="Oval 14">
+            <a:extLst>
+              <a:ext uri="{FF2B5EF4-FFF2-40B4-BE49-F238E27FC236}">
+                <a16:creationId xmlns:a16="http://schemas.microsoft.com/office/drawing/2014/main" id="{4AC0CD9D-7610-4620-93B4-798CCD9AB581}"/>
+              </a:ext>
+              <a:ext uri="{C183D7F6-B498-43B3-948B-1728B52AA6E4}">
+                <adec:decorative xmlns:adec="http://schemas.microsoft.com/office/drawing/2017/decorative" val="1"/>
+              </a:ext>
+            </a:extLst>
+          </p:cNvPr>
+          <p:cNvSpPr>
+            <a:spLocks noGrp="1" noRot="1" noChangeAspect="1" noMove="1" noResize="1" noEditPoints="1" noAdjustHandles="1" noChangeArrowheads="1" noChangeShapeType="1" noTextEdit="1"/>
+          </p:cNvSpPr>
+          <p:nvPr>
+            <p:extLst>
+              <p:ext uri="{386F3935-93C4-4BCD-93E2-E3B085C9AB24}">
+                <p16:designElem xmlns:p16="http://schemas.microsoft.com/office/powerpoint/2015/main" val="1"/>
+              </p:ext>
+            </p:extLst>
+          </p:nvPr>
+        </p:nvSpPr>
+        <p:spPr>
+          <a:xfrm>
+            <a:off x="8609012" y="1676400"/>
+            <a:ext cx="2819400" cy="2819400"/>
+          </a:xfrm>
+          <a:prstGeom prst="ellipse">
+            <a:avLst/>
+          </a:prstGeom>
+          <a:gradFill flip="none" rotWithShape="1">
+            <a:gsLst>
+              <a:gs pos="0">
+                <a:schemeClr val="bg2">
+                  <a:lumMod val="60000"/>
+                  <a:lumOff val="40000"/>
+                  <a:alpha val="7000"/>
+                </a:schemeClr>
+              </a:gs>
+              <a:gs pos="69000">
+                <a:schemeClr val="bg2">
+                  <a:lumMod val="60000"/>
+                  <a:lumOff val="40000"/>
+                  <a:alpha val="0"/>
+                </a:schemeClr>
+              </a:gs>
+              <a:gs pos="36000">
+                <a:schemeClr val="bg2">
+                  <a:lumMod val="60000"/>
+                  <a:lumOff val="40000"/>
+                  <a:alpha val="6000"/>
+                </a:schemeClr>
+              </a:gs>
+            </a:gsLst>
+            <a:path path="circle">
+              <a:fillToRect l="50000" t="50000" r="50000" b="50000"/>
+            </a:path>
+            <a:tileRect/>
+          </a:gradFill>
+          <a:ln>
+            <a:noFill/>
+          </a:ln>
+          <a:effectLst/>
+        </p:spPr>
+        <p:style>
+          <a:lnRef idx="1">
+            <a:schemeClr val="accent1"/>
+          </a:lnRef>
+          <a:fillRef idx="3">
+            <a:schemeClr val="accent1"/>
+          </a:fillRef>
+          <a:effectRef idx="2">
+            <a:schemeClr val="accent1"/>
+          </a:effectRef>
+          <a:fontRef idx="minor">
+            <a:schemeClr val="lt1"/>
+          </a:fontRef>
+        </p:style>
+      </p:sp>
+      <p:pic>
+        <p:nvPicPr>
+          <p:cNvPr id="17" name="Picture 16">
+            <a:extLst>
+              <a:ext uri="{FF2B5EF4-FFF2-40B4-BE49-F238E27FC236}">
+                <a16:creationId xmlns:a16="http://schemas.microsoft.com/office/drawing/2014/main" id="{B9238B3E-24AA-439A-B527-6C5DF6D72145}"/>
+              </a:ext>
+              <a:ext uri="{C183D7F6-B498-43B3-948B-1728B52AA6E4}">
+                <adec:decorative xmlns:adec="http://schemas.microsoft.com/office/drawing/2017/decorative" val="1"/>
+              </a:ext>
+            </a:extLst>
+          </p:cNvPr>
+          <p:cNvPicPr>
+            <a:picLocks noGrp="1" noRot="1" noChangeAspect="1" noMove="1" noResize="1" noEditPoints="1" noAdjustHandles="1" noChangeArrowheads="1" noChangeShapeType="1" noCrop="1"/>
+          </p:cNvPicPr>
+          <p:nvPr>
+            <p:extLst>
+              <p:ext uri="{386F3935-93C4-4BCD-93E2-E3B085C9AB24}">
+                <p16:designElem xmlns:p16="http://schemas.microsoft.com/office/powerpoint/2015/main" val="1"/>
+              </p:ext>
+            </p:extLst>
+          </p:nvPr>
+        </p:nvPicPr>
+        <p:blipFill rotWithShape="1">
+          <a:blip r:embed="rId4">
+            <a:extLst>
+              <a:ext uri="{28A0092B-C50C-407E-A947-70E740481C1C}">
+                <a14:useLocalDpi xmlns:a14="http://schemas.microsoft.com/office/drawing/2010/main" val="0"/>
+              </a:ext>
+            </a:extLst>
+          </a:blip>
+          <a:srcRect t="28813"/>
+          <a:stretch/>
+        </p:blipFill>
+        <p:spPr>
+          <a:xfrm>
+            <a:off x="7999412" y="0"/>
+            <a:ext cx="1603387" cy="1141407"/>
+          </a:xfrm>
+          <a:prstGeom prst="rect">
+            <a:avLst/>
+          </a:prstGeom>
+        </p:spPr>
+      </p:pic>
+      <p:pic>
+        <p:nvPicPr>
+          <p:cNvPr id="19" name="Picture 18">
+            <a:extLst>
+              <a:ext uri="{FF2B5EF4-FFF2-40B4-BE49-F238E27FC236}">
+                <a16:creationId xmlns:a16="http://schemas.microsoft.com/office/drawing/2014/main" id="{69F01145-BEA3-4CBF-AA21-10077B948CA8}"/>
+              </a:ext>
+              <a:ext uri="{C183D7F6-B498-43B3-948B-1728B52AA6E4}">
+                <adec:decorative xmlns:adec="http://schemas.microsoft.com/office/drawing/2017/decorative" val="1"/>
+              </a:ext>
+            </a:extLst>
+          </p:cNvPr>
+          <p:cNvPicPr>
+            <a:picLocks noGrp="1" noRot="1" noChangeAspect="1" noMove="1" noResize="1" noEditPoints="1" noAdjustHandles="1" noChangeArrowheads="1" noChangeShapeType="1" noCrop="1"/>
+          </p:cNvPicPr>
+          <p:nvPr>
+            <p:extLst>
+              <p:ext uri="{386F3935-93C4-4BCD-93E2-E3B085C9AB24}">
+                <p16:designElem xmlns:p16="http://schemas.microsoft.com/office/powerpoint/2015/main" val="1"/>
+              </p:ext>
+            </p:extLst>
+          </p:nvPr>
+        </p:nvPicPr>
+        <p:blipFill rotWithShape="1">
+          <a:blip r:embed="rId5">
+            <a:extLst>
+              <a:ext uri="{28A0092B-C50C-407E-A947-70E740481C1C}">
+                <a14:useLocalDpi xmlns:a14="http://schemas.microsoft.com/office/drawing/2010/main" val="0"/>
+              </a:ext>
+            </a:extLst>
+          </a:blip>
+          <a:srcRect b="23320"/>
+          <a:stretch/>
+        </p:blipFill>
+        <p:spPr>
+          <a:xfrm>
+            <a:off x="8605878" y="6096000"/>
+            <a:ext cx="993734" cy="762000"/>
+          </a:xfrm>
+          <a:prstGeom prst="rect">
+            <a:avLst/>
+          </a:prstGeom>
+        </p:spPr>
+      </p:pic>
+      <p:sp>
+        <p:nvSpPr>
+          <p:cNvPr id="21" name="Rectangle 20">
+            <a:extLst>
+              <a:ext uri="{FF2B5EF4-FFF2-40B4-BE49-F238E27FC236}">
+                <a16:creationId xmlns:a16="http://schemas.microsoft.com/office/drawing/2014/main" id="{DE4D62F9-188E-4530-84C2-24BDEE4BEB82}"/>
+              </a:ext>
+              <a:ext uri="{C183D7F6-B498-43B3-948B-1728B52AA6E4}">
+                <adec:decorative xmlns:adec="http://schemas.microsoft.com/office/drawing/2017/decorative" val="1"/>
+              </a:ext>
+            </a:extLst>
+          </p:cNvPr>
+          <p:cNvSpPr>
+            <a:spLocks noGrp="1" noRot="1" noChangeAspect="1" noMove="1" noResize="1" noEditPoints="1" noAdjustHandles="1" noChangeArrowheads="1" noChangeShapeType="1" noTextEdit="1"/>
+          </p:cNvSpPr>
+          <p:nvPr>
+            <p:extLst>
+              <p:ext uri="{386F3935-93C4-4BCD-93E2-E3B085C9AB24}">
+                <p16:designElem xmlns:p16="http://schemas.microsoft.com/office/powerpoint/2015/main" val="1"/>
+              </p:ext>
+            </p:extLst>
+          </p:nvPr>
+        </p:nvSpPr>
+        <p:spPr>
+          <a:xfrm>
+            <a:off x="10437812" y="0"/>
+            <a:ext cx="685800" cy="1143000"/>
+          </a:xfrm>
+          <a:prstGeom prst="rect">
+            <a:avLst/>
+          </a:prstGeom>
+          <a:solidFill>
+            <a:schemeClr val="accent1"/>
+          </a:solidFill>
+          <a:ln>
+            <a:noFill/>
+          </a:ln>
+        </p:spPr>
+        <p:style>
+          <a:lnRef idx="1">
+            <a:schemeClr val="accent1"/>
+          </a:lnRef>
+          <a:fillRef idx="3">
+            <a:schemeClr val="accent1"/>
+          </a:fillRef>
+          <a:effectRef idx="2">
+            <a:schemeClr val="accent1"/>
+          </a:effectRef>
+          <a:fontRef idx="minor">
+            <a:schemeClr val="lt1"/>
+          </a:fontRef>
+        </p:style>
+      </p:sp>
+      <p:sp>
+        <p:nvSpPr>
+          <p:cNvPr id="23" name="Rectangle 22">
+            <a:extLst>
+              <a:ext uri="{FF2B5EF4-FFF2-40B4-BE49-F238E27FC236}">
+                <a16:creationId xmlns:a16="http://schemas.microsoft.com/office/drawing/2014/main" id="{757B325C-3E35-45CF-9D07-3BCB281F3B9C}"/>
+              </a:ext>
+              <a:ext uri="{C183D7F6-B498-43B3-948B-1728B52AA6E4}">
+                <adec:decorative xmlns:adec="http://schemas.microsoft.com/office/drawing/2017/decorative" val="1"/>
+              </a:ext>
+            </a:extLst>
+          </p:cNvPr>
+          <p:cNvSpPr>
+            <a:spLocks noGrp="1" noRot="1" noChangeAspect="1" noMove="1" noResize="1" noEditPoints="1" noAdjustHandles="1" noChangeArrowheads="1" noChangeShapeType="1" noTextEdit="1"/>
+          </p:cNvSpPr>
+          <p:nvPr>
+            <p:extLst>
+              <p:ext uri="{386F3935-93C4-4BCD-93E2-E3B085C9AB24}">
+                <p16:designElem xmlns:p16="http://schemas.microsoft.com/office/powerpoint/2015/main" val="1"/>
+              </p:ext>
+            </p:extLst>
+          </p:nvPr>
+        </p:nvSpPr>
+        <p:spPr>
+          <a:xfrm>
+            <a:off x="0" y="0"/>
+            <a:ext cx="12192000" cy="6858000"/>
+          </a:xfrm>
+          <a:prstGeom prst="rect">
+            <a:avLst/>
+          </a:prstGeom>
+          <a:ln>
+            <a:noFill/>
+          </a:ln>
+        </p:spPr>
+        <p:style>
+          <a:lnRef idx="2">
+            <a:schemeClr val="accent1">
+              <a:shade val="50000"/>
+            </a:schemeClr>
+          </a:lnRef>
+          <a:fillRef idx="1003">
+            <a:schemeClr val="dk2"/>
+          </a:fillRef>
+          <a:effectRef idx="0">
+            <a:schemeClr val="accent1"/>
+          </a:effectRef>
+          <a:fontRef idx="minor">
+            <a:schemeClr val="lt1"/>
+          </a:fontRef>
+        </p:style>
+        <p:txBody>
+          <a:bodyPr rtlCol="0" anchor="ctr"/>
+          <a:lstStyle/>
+          <a:p>
+            <a:pPr algn="ctr"/>
+            <a:endParaRPr lang="en-US"/>
+          </a:p>
+        </p:txBody>
+      </p:sp>
+      <p:sp>
+        <p:nvSpPr>
+          <p:cNvPr id="2" name="Title 1">
+            <a:extLst>
+              <a:ext uri="{FF2B5EF4-FFF2-40B4-BE49-F238E27FC236}">
+                <a16:creationId xmlns:a16="http://schemas.microsoft.com/office/drawing/2014/main" id="{A6F5B8DB-E45A-614F-AC13-C19C2287C4BF}"/>
+              </a:ext>
+            </a:extLst>
+          </p:cNvPr>
+          <p:cNvSpPr>
+            <a:spLocks noGrp="1"/>
+          </p:cNvSpPr>
+          <p:nvPr>
+            <p:ph type="title"/>
+          </p:nvPr>
+        </p:nvSpPr>
+        <p:spPr>
+          <a:xfrm>
+            <a:off x="7999412" y="-1"/>
+            <a:ext cx="4192587" cy="6858001"/>
+          </a:xfrm>
+        </p:spPr>
+        <p:txBody>
+          <a:bodyPr vert="horz" lIns="91440" tIns="45720" rIns="91440" bIns="45720" rtlCol="0" anchor="ctr">
+            <a:normAutofit/>
+          </a:bodyPr>
+          <a:lstStyle/>
+          <a:p>
+            <a:pPr algn="ctr">
+              <a:lnSpc>
+                <a:spcPct val="90000"/>
+              </a:lnSpc>
+            </a:pPr>
+            <a:r>
+              <a:rPr lang="en-US" sz="5000" b="0" i="0" kern="1200" dirty="0">
+                <a:solidFill>
+                  <a:srgbClr val="EBEBEB"/>
+                </a:solidFill>
+                <a:latin typeface="+mj-lt"/>
+                <a:ea typeface="+mj-ea"/>
+                <a:cs typeface="+mj-cs"/>
+              </a:rPr>
+              <a:t>Visualize Private Shelters</a:t>
+            </a:r>
+          </a:p>
+        </p:txBody>
+      </p:sp>
+      <p:sp>
+        <p:nvSpPr>
+          <p:cNvPr id="25" name="Freeform 36">
+            <a:extLst>
+              <a:ext uri="{FF2B5EF4-FFF2-40B4-BE49-F238E27FC236}">
+                <a16:creationId xmlns:a16="http://schemas.microsoft.com/office/drawing/2014/main" id="{C24BEC42-AFF3-40D1-93A2-A27A42E1E23C}"/>
+              </a:ext>
+              <a:ext uri="{C183D7F6-B498-43B3-948B-1728B52AA6E4}">
+                <adec:decorative xmlns:adec="http://schemas.microsoft.com/office/drawing/2017/decorative" val="1"/>
+              </a:ext>
+            </a:extLst>
+          </p:cNvPr>
+          <p:cNvSpPr>
+            <a:spLocks noGrp="1" noRot="1" noChangeAspect="1" noMove="1" noResize="1" noEditPoints="1" noAdjustHandles="1" noChangeArrowheads="1" noChangeShapeType="1" noTextEdit="1"/>
+          </p:cNvSpPr>
+          <p:nvPr>
+            <p:extLst>
+              <p:ext uri="{386F3935-93C4-4BCD-93E2-E3B085C9AB24}">
+                <p16:designElem xmlns:p16="http://schemas.microsoft.com/office/powerpoint/2015/main" val="1"/>
+              </p:ext>
+            </p:extLst>
+          </p:nvPr>
+        </p:nvSpPr>
+        <p:spPr>
+          <a:xfrm flipH="1">
+            <a:off x="7463681" y="-1"/>
+            <a:ext cx="559472" cy="3709642"/>
+          </a:xfrm>
+          <a:custGeom>
+            <a:avLst/>
+            <a:gdLst>
+              <a:gd name="connsiteX0" fmla="*/ 0 w 559472"/>
+              <a:gd name="connsiteY0" fmla="*/ 0 h 3709642"/>
+              <a:gd name="connsiteX1" fmla="*/ 473952 w 559472"/>
+              <a:gd name="connsiteY1" fmla="*/ 0 h 3709642"/>
+              <a:gd name="connsiteX2" fmla="*/ 485840 w 559472"/>
+              <a:gd name="connsiteY2" fmla="*/ 161194 h 3709642"/>
+              <a:gd name="connsiteX3" fmla="*/ 523949 w 559472"/>
+              <a:gd name="connsiteY3" fmla="*/ 3672197 h 3709642"/>
+              <a:gd name="connsiteX4" fmla="*/ 454748 w 559472"/>
+              <a:gd name="connsiteY4" fmla="*/ 3709642 h 3709642"/>
+              <a:gd name="connsiteX5" fmla="*/ 448224 w 559472"/>
+              <a:gd name="connsiteY5" fmla="*/ 3510471 h 3709642"/>
+              <a:gd name="connsiteX6" fmla="*/ 443564 w 559472"/>
+              <a:gd name="connsiteY6" fmla="*/ 3408563 h 3709642"/>
+              <a:gd name="connsiteX7" fmla="*/ 438902 w 559472"/>
+              <a:gd name="connsiteY7" fmla="*/ 3304407 h 3709642"/>
+              <a:gd name="connsiteX8" fmla="*/ 433941 w 559472"/>
+              <a:gd name="connsiteY8" fmla="*/ 3198777 h 3709642"/>
+              <a:gd name="connsiteX9" fmla="*/ 427584 w 559472"/>
+              <a:gd name="connsiteY9" fmla="*/ 3092510 h 3709642"/>
+              <a:gd name="connsiteX10" fmla="*/ 420988 w 559472"/>
+              <a:gd name="connsiteY10" fmla="*/ 2984390 h 3709642"/>
+              <a:gd name="connsiteX11" fmla="*/ 414330 w 559472"/>
+              <a:gd name="connsiteY11" fmla="*/ 2874401 h 3709642"/>
+              <a:gd name="connsiteX12" fmla="*/ 406840 w 559472"/>
+              <a:gd name="connsiteY12" fmla="*/ 2762980 h 3709642"/>
+              <a:gd name="connsiteX13" fmla="*/ 397745 w 559472"/>
+              <a:gd name="connsiteY13" fmla="*/ 2650566 h 3709642"/>
+              <a:gd name="connsiteX14" fmla="*/ 389154 w 559472"/>
+              <a:gd name="connsiteY14" fmla="*/ 2536612 h 3709642"/>
+              <a:gd name="connsiteX15" fmla="*/ 379225 w 559472"/>
+              <a:gd name="connsiteY15" fmla="*/ 2421642 h 3709642"/>
+              <a:gd name="connsiteX16" fmla="*/ 368316 w 559472"/>
+              <a:gd name="connsiteY16" fmla="*/ 2305627 h 3709642"/>
+              <a:gd name="connsiteX17" fmla="*/ 357466 w 559472"/>
+              <a:gd name="connsiteY17" fmla="*/ 2189233 h 3709642"/>
+              <a:gd name="connsiteX18" fmla="*/ 344982 w 559472"/>
+              <a:gd name="connsiteY18" fmla="*/ 2071473 h 3709642"/>
+              <a:gd name="connsiteX19" fmla="*/ 332466 w 559472"/>
+              <a:gd name="connsiteY19" fmla="*/ 1952216 h 3709642"/>
+              <a:gd name="connsiteX20" fmla="*/ 319121 w 559472"/>
+              <a:gd name="connsiteY20" fmla="*/ 1833776 h 3709642"/>
+              <a:gd name="connsiteX21" fmla="*/ 304408 w 559472"/>
+              <a:gd name="connsiteY21" fmla="*/ 1713948 h 3709642"/>
+              <a:gd name="connsiteX22" fmla="*/ 288685 w 559472"/>
+              <a:gd name="connsiteY22" fmla="*/ 1592703 h 3709642"/>
+              <a:gd name="connsiteX23" fmla="*/ 273050 w 559472"/>
+              <a:gd name="connsiteY23" fmla="*/ 1471451 h 3709642"/>
+              <a:gd name="connsiteX24" fmla="*/ 255813 w 559472"/>
+              <a:gd name="connsiteY24" fmla="*/ 1350328 h 3709642"/>
+              <a:gd name="connsiteX25" fmla="*/ 237060 w 559472"/>
+              <a:gd name="connsiteY25" fmla="*/ 1227080 h 3709642"/>
+              <a:gd name="connsiteX26" fmla="*/ 218488 w 559472"/>
+              <a:gd name="connsiteY26" fmla="*/ 1106065 h 3709642"/>
+              <a:gd name="connsiteX27" fmla="*/ 198221 w 559472"/>
+              <a:gd name="connsiteY27" fmla="*/ 982940 h 3709642"/>
+              <a:gd name="connsiteX28" fmla="*/ 177152 w 559472"/>
+              <a:gd name="connsiteY28" fmla="*/ 858755 h 3709642"/>
+              <a:gd name="connsiteX29" fmla="*/ 155551 w 559472"/>
+              <a:gd name="connsiteY29" fmla="*/ 736861 h 3709642"/>
+              <a:gd name="connsiteX30" fmla="*/ 131782 w 559472"/>
+              <a:gd name="connsiteY30" fmla="*/ 613645 h 3709642"/>
+              <a:gd name="connsiteX31" fmla="*/ 107123 w 559472"/>
+              <a:gd name="connsiteY31" fmla="*/ 490500 h 3709642"/>
+              <a:gd name="connsiteX32" fmla="*/ 82552 w 559472"/>
+              <a:gd name="connsiteY32" fmla="*/ 367348 h 3709642"/>
+              <a:gd name="connsiteX33" fmla="*/ 55608 w 559472"/>
+              <a:gd name="connsiteY33" fmla="*/ 244762 h 3709642"/>
+              <a:gd name="connsiteX34" fmla="*/ 28130 w 559472"/>
+              <a:gd name="connsiteY34" fmla="*/ 122220 h 3709642"/>
+              <a:gd name="connsiteX35" fmla="*/ 0 w 559472"/>
+              <a:gd name="connsiteY35" fmla="*/ 0 h 3709642"/>
+            </a:gdLst>
+            <a:ahLst/>
+            <a:cxnLst>
+              <a:cxn ang="0">
+                <a:pos x="connsiteX0" y="connsiteY0"/>
+              </a:cxn>
+              <a:cxn ang="0">
+                <a:pos x="connsiteX1" y="connsiteY1"/>
+              </a:cxn>
+              <a:cxn ang="0">
+                <a:pos x="connsiteX2" y="connsiteY2"/>
+              </a:cxn>
+              <a:cxn ang="0">
+                <a:pos x="connsiteX3" y="connsiteY3"/>
+              </a:cxn>
+              <a:cxn ang="0">
+                <a:pos x="connsiteX4" y="connsiteY4"/>
+              </a:cxn>
+              <a:cxn ang="0">
+                <a:pos x="connsiteX5" y="connsiteY5"/>
+              </a:cxn>
+              <a:cxn ang="0">
+                <a:pos x="connsiteX6" y="connsiteY6"/>
+              </a:cxn>
+              <a:cxn ang="0">
+                <a:pos x="connsiteX7" y="connsiteY7"/>
+              </a:cxn>
+              <a:cxn ang="0">
+                <a:pos x="connsiteX8" y="connsiteY8"/>
+              </a:cxn>
+              <a:cxn ang="0">
+                <a:pos x="connsiteX9" y="connsiteY9"/>
+              </a:cxn>
+              <a:cxn ang="0">
+                <a:pos x="connsiteX10" y="connsiteY10"/>
+              </a:cxn>
+              <a:cxn ang="0">
+                <a:pos x="connsiteX11" y="connsiteY11"/>
+              </a:cxn>
+              <a:cxn ang="0">
+                <a:pos x="connsiteX12" y="connsiteY12"/>
+              </a:cxn>
+              <a:cxn ang="0">
+                <a:pos x="connsiteX13" y="connsiteY13"/>
+              </a:cxn>
+              <a:cxn ang="0">
+                <a:pos x="connsiteX14" y="connsiteY14"/>
+              </a:cxn>
+              <a:cxn ang="0">
+                <a:pos x="connsiteX15" y="connsiteY15"/>
+              </a:cxn>
+              <a:cxn ang="0">
+                <a:pos x="connsiteX16" y="connsiteY16"/>
+              </a:cxn>
+              <a:cxn ang="0">
+                <a:pos x="connsiteX17" y="connsiteY17"/>
+              </a:cxn>
+              <a:cxn ang="0">
+                <a:pos x="connsiteX18" y="connsiteY18"/>
+              </a:cxn>
+              <a:cxn ang="0">
+                <a:pos x="connsiteX19" y="connsiteY19"/>
+              </a:cxn>
+              <a:cxn ang="0">
+                <a:pos x="connsiteX20" y="connsiteY20"/>
+              </a:cxn>
+              <a:cxn ang="0">
+                <a:pos x="connsiteX21" y="connsiteY21"/>
+              </a:cxn>
+              <a:cxn ang="0">
+                <a:pos x="connsiteX22" y="connsiteY22"/>
+              </a:cxn>
+              <a:cxn ang="0">
+                <a:pos x="connsiteX23" y="connsiteY23"/>
+              </a:cxn>
+              <a:cxn ang="0">
+                <a:pos x="connsiteX24" y="connsiteY24"/>
+              </a:cxn>
+              <a:cxn ang="0">
+                <a:pos x="connsiteX25" y="connsiteY25"/>
+              </a:cxn>
+              <a:cxn ang="0">
+                <a:pos x="connsiteX26" y="connsiteY26"/>
+              </a:cxn>
+              <a:cxn ang="0">
+                <a:pos x="connsiteX27" y="connsiteY27"/>
+              </a:cxn>
+              <a:cxn ang="0">
+                <a:pos x="connsiteX28" y="connsiteY28"/>
+              </a:cxn>
+              <a:cxn ang="0">
+                <a:pos x="connsiteX29" y="connsiteY29"/>
+              </a:cxn>
+              <a:cxn ang="0">
+                <a:pos x="connsiteX30" y="connsiteY30"/>
+              </a:cxn>
+              <a:cxn ang="0">
+                <a:pos x="connsiteX31" y="connsiteY31"/>
+              </a:cxn>
+              <a:cxn ang="0">
+                <a:pos x="connsiteX32" y="connsiteY32"/>
+              </a:cxn>
+              <a:cxn ang="0">
+                <a:pos x="connsiteX33" y="connsiteY33"/>
+              </a:cxn>
+              <a:cxn ang="0">
+                <a:pos x="connsiteX34" y="connsiteY34"/>
+              </a:cxn>
+              <a:cxn ang="0">
+                <a:pos x="connsiteX35" y="connsiteY35"/>
+              </a:cxn>
+            </a:cxnLst>
+            <a:rect l="l" t="t" r="r" b="b"/>
+            <a:pathLst>
+              <a:path w="559472" h="3709642">
+                <a:moveTo>
+                  <a:pt x="0" y="0"/>
+                </a:moveTo>
+                <a:lnTo>
+                  <a:pt x="473952" y="0"/>
+                </a:lnTo>
+                <a:lnTo>
+                  <a:pt x="485840" y="161194"/>
+                </a:lnTo>
+                <a:cubicBezTo>
+                  <a:pt x="552063" y="1147770"/>
+                  <a:pt x="592441" y="3086737"/>
+                  <a:pt x="523949" y="3672197"/>
+                </a:cubicBezTo>
+                <a:cubicBezTo>
+                  <a:pt x="500842" y="3684557"/>
+                  <a:pt x="477855" y="3697282"/>
+                  <a:pt x="454748" y="3709642"/>
+                </a:cubicBezTo>
+                <a:lnTo>
+                  <a:pt x="448224" y="3510471"/>
+                </a:lnTo>
+                <a:lnTo>
+                  <a:pt x="443564" y="3408563"/>
+                </a:lnTo>
+                <a:lnTo>
+                  <a:pt x="438902" y="3304407"/>
+                </a:lnTo>
+                <a:lnTo>
+                  <a:pt x="433941" y="3198777"/>
+                </a:lnTo>
+                <a:lnTo>
+                  <a:pt x="427584" y="3092510"/>
+                </a:lnTo>
+                <a:lnTo>
+                  <a:pt x="420988" y="2984390"/>
+                </a:lnTo>
+                <a:lnTo>
+                  <a:pt x="414330" y="2874401"/>
+                </a:lnTo>
+                <a:lnTo>
+                  <a:pt x="406840" y="2762980"/>
+                </a:lnTo>
+                <a:lnTo>
+                  <a:pt x="397745" y="2650566"/>
+                </a:lnTo>
+                <a:lnTo>
+                  <a:pt x="389154" y="2536612"/>
+                </a:lnTo>
+                <a:lnTo>
+                  <a:pt x="379225" y="2421642"/>
+                </a:lnTo>
+                <a:lnTo>
+                  <a:pt x="368316" y="2305627"/>
+                </a:lnTo>
+                <a:lnTo>
+                  <a:pt x="357466" y="2189233"/>
+                </a:lnTo>
+                <a:lnTo>
+                  <a:pt x="344982" y="2071473"/>
+                </a:lnTo>
+                <a:lnTo>
+                  <a:pt x="332466" y="1952216"/>
+                </a:lnTo>
+                <a:lnTo>
+                  <a:pt x="319121" y="1833776"/>
+                </a:lnTo>
+                <a:lnTo>
+                  <a:pt x="304408" y="1713948"/>
+                </a:lnTo>
+                <a:lnTo>
+                  <a:pt x="288685" y="1592703"/>
+                </a:lnTo>
+                <a:lnTo>
+                  <a:pt x="273050" y="1471451"/>
+                </a:lnTo>
+                <a:lnTo>
+                  <a:pt x="255813" y="1350328"/>
+                </a:lnTo>
+                <a:lnTo>
+                  <a:pt x="237060" y="1227080"/>
+                </a:lnTo>
+                <a:lnTo>
+                  <a:pt x="218488" y="1106065"/>
+                </a:lnTo>
+                <a:lnTo>
+                  <a:pt x="198221" y="982940"/>
+                </a:lnTo>
+                <a:lnTo>
+                  <a:pt x="177152" y="858755"/>
+                </a:lnTo>
+                <a:lnTo>
+                  <a:pt x="155551" y="736861"/>
+                </a:lnTo>
+                <a:lnTo>
+                  <a:pt x="131782" y="613645"/>
+                </a:lnTo>
+                <a:lnTo>
+                  <a:pt x="107123" y="490500"/>
+                </a:lnTo>
+                <a:lnTo>
+                  <a:pt x="82552" y="367348"/>
+                </a:lnTo>
+                <a:lnTo>
+                  <a:pt x="55608" y="244762"/>
+                </a:lnTo>
+                <a:lnTo>
+                  <a:pt x="28130" y="122220"/>
+                </a:lnTo>
+                <a:lnTo>
+                  <a:pt x="0" y="0"/>
+                </a:lnTo>
+                <a:close/>
+              </a:path>
+            </a:pathLst>
+          </a:custGeom>
+          <a:solidFill>
+            <a:schemeClr val="bg1">
+              <a:alpha val="20000"/>
+            </a:schemeClr>
+          </a:solidFill>
+          <a:ln>
+            <a:noFill/>
+          </a:ln>
+        </p:spPr>
+        <p:txBody>
+          <a:bodyPr rtlCol="0" anchor="ctr"/>
+          <a:lstStyle/>
+          <a:p>
+            <a:pPr algn="ctr"/>
+            <a:endParaRPr lang="en-US"/>
+          </a:p>
+        </p:txBody>
+      </p:sp>
+      <p:sp useBgFill="1">
+        <p:nvSpPr>
+          <p:cNvPr id="27" name="Freeform: Shape 26">
+            <a:extLst>
+              <a:ext uri="{FF2B5EF4-FFF2-40B4-BE49-F238E27FC236}">
+                <a16:creationId xmlns:a16="http://schemas.microsoft.com/office/drawing/2014/main" id="{608F427C-1EC9-4280-9367-F2B3AA063E82}"/>
+              </a:ext>
+              <a:ext uri="{C183D7F6-B498-43B3-948B-1728B52AA6E4}">
+                <adec:decorative xmlns:adec="http://schemas.microsoft.com/office/drawing/2017/decorative" val="1"/>
+              </a:ext>
+            </a:extLst>
+          </p:cNvPr>
+          <p:cNvSpPr>
+            <a:spLocks noGrp="1" noRot="1" noChangeAspect="1" noMove="1" noResize="1" noEditPoints="1" noAdjustHandles="1" noChangeArrowheads="1" noChangeShapeType="1" noTextEdit="1"/>
+          </p:cNvSpPr>
+          <p:nvPr>
+            <p:extLst>
+              <p:ext uri="{386F3935-93C4-4BCD-93E2-E3B085C9AB24}">
+                <p16:designElem xmlns:p16="http://schemas.microsoft.com/office/powerpoint/2015/main" val="1"/>
+              </p:ext>
+            </p:extLst>
+          </p:nvPr>
+        </p:nvSpPr>
+        <p:spPr>
+          <a:xfrm>
+            <a:off x="0" y="0"/>
+            <a:ext cx="7809954" cy="6858000"/>
+          </a:xfrm>
+          <a:custGeom>
+            <a:avLst/>
+            <a:gdLst>
+              <a:gd name="connsiteX0" fmla="*/ 6465239 w 7809954"/>
+              <a:gd name="connsiteY0" fmla="*/ 0 h 6858000"/>
+              <a:gd name="connsiteX1" fmla="*/ 7808777 w 7809954"/>
+              <a:gd name="connsiteY1" fmla="*/ 0 h 6858000"/>
+              <a:gd name="connsiteX2" fmla="*/ 7783732 w 7809954"/>
+              <a:gd name="connsiteY2" fmla="*/ 155676 h 6858000"/>
+              <a:gd name="connsiteX3" fmla="*/ 7759863 w 7809954"/>
+              <a:gd name="connsiteY3" fmla="*/ 310667 h 6858000"/>
+              <a:gd name="connsiteX4" fmla="*/ 7736499 w 7809954"/>
+              <a:gd name="connsiteY4" fmla="*/ 466344 h 6858000"/>
+              <a:gd name="connsiteX5" fmla="*/ 7716496 w 7809954"/>
+              <a:gd name="connsiteY5" fmla="*/ 622706 h 6858000"/>
+              <a:gd name="connsiteX6" fmla="*/ 7696325 w 7809954"/>
+              <a:gd name="connsiteY6" fmla="*/ 778383 h 6858000"/>
+              <a:gd name="connsiteX7" fmla="*/ 7677499 w 7809954"/>
+              <a:gd name="connsiteY7" fmla="*/ 934745 h 6858000"/>
+              <a:gd name="connsiteX8" fmla="*/ 7661363 w 7809954"/>
+              <a:gd name="connsiteY8" fmla="*/ 1089050 h 6858000"/>
+              <a:gd name="connsiteX9" fmla="*/ 7646067 w 7809954"/>
+              <a:gd name="connsiteY9" fmla="*/ 1245413 h 6858000"/>
+              <a:gd name="connsiteX10" fmla="*/ 7632115 w 7809954"/>
+              <a:gd name="connsiteY10" fmla="*/ 1401089 h 6858000"/>
+              <a:gd name="connsiteX11" fmla="*/ 7620013 w 7809954"/>
+              <a:gd name="connsiteY11" fmla="*/ 1554023 h 6858000"/>
+              <a:gd name="connsiteX12" fmla="*/ 7607910 w 7809954"/>
+              <a:gd name="connsiteY12" fmla="*/ 1709013 h 6858000"/>
+              <a:gd name="connsiteX13" fmla="*/ 7597825 w 7809954"/>
+              <a:gd name="connsiteY13" fmla="*/ 1861947 h 6858000"/>
+              <a:gd name="connsiteX14" fmla="*/ 7589925 w 7809954"/>
+              <a:gd name="connsiteY14" fmla="*/ 2014880 h 6858000"/>
+              <a:gd name="connsiteX15" fmla="*/ 7581688 w 7809954"/>
+              <a:gd name="connsiteY15" fmla="*/ 2167128 h 6858000"/>
+              <a:gd name="connsiteX16" fmla="*/ 7574797 w 7809954"/>
+              <a:gd name="connsiteY16" fmla="*/ 2318004 h 6858000"/>
+              <a:gd name="connsiteX17" fmla="*/ 7569922 w 7809954"/>
+              <a:gd name="connsiteY17" fmla="*/ 2467508 h 6858000"/>
+              <a:gd name="connsiteX18" fmla="*/ 7565720 w 7809954"/>
+              <a:gd name="connsiteY18" fmla="*/ 2617013 h 6858000"/>
+              <a:gd name="connsiteX19" fmla="*/ 7561686 w 7809954"/>
+              <a:gd name="connsiteY19" fmla="*/ 2765145 h 6858000"/>
+              <a:gd name="connsiteX20" fmla="*/ 7559837 w 7809954"/>
+              <a:gd name="connsiteY20" fmla="*/ 2911221 h 6858000"/>
+              <a:gd name="connsiteX21" fmla="*/ 7557820 w 7809954"/>
+              <a:gd name="connsiteY21" fmla="*/ 3057296 h 6858000"/>
+              <a:gd name="connsiteX22" fmla="*/ 7556811 w 7809954"/>
+              <a:gd name="connsiteY22" fmla="*/ 3201314 h 6858000"/>
+              <a:gd name="connsiteX23" fmla="*/ 7557820 w 7809954"/>
+              <a:gd name="connsiteY23" fmla="*/ 3343960 h 6858000"/>
+              <a:gd name="connsiteX24" fmla="*/ 7557820 w 7809954"/>
+              <a:gd name="connsiteY24" fmla="*/ 3485235 h 6858000"/>
+              <a:gd name="connsiteX25" fmla="*/ 7559837 w 7809954"/>
+              <a:gd name="connsiteY25" fmla="*/ 3625138 h 6858000"/>
+              <a:gd name="connsiteX26" fmla="*/ 7562862 w 7809954"/>
+              <a:gd name="connsiteY26" fmla="*/ 3762298 h 6858000"/>
+              <a:gd name="connsiteX27" fmla="*/ 7565720 w 7809954"/>
+              <a:gd name="connsiteY27" fmla="*/ 3898087 h 6858000"/>
+              <a:gd name="connsiteX28" fmla="*/ 7568914 w 7809954"/>
+              <a:gd name="connsiteY28" fmla="*/ 4031132 h 6858000"/>
+              <a:gd name="connsiteX29" fmla="*/ 7573788 w 7809954"/>
+              <a:gd name="connsiteY29" fmla="*/ 4163491 h 6858000"/>
+              <a:gd name="connsiteX30" fmla="*/ 7578999 w 7809954"/>
+              <a:gd name="connsiteY30" fmla="*/ 4293793 h 6858000"/>
+              <a:gd name="connsiteX31" fmla="*/ 7583705 w 7809954"/>
+              <a:gd name="connsiteY31" fmla="*/ 4421352 h 6858000"/>
+              <a:gd name="connsiteX32" fmla="*/ 7596985 w 7809954"/>
+              <a:gd name="connsiteY32" fmla="*/ 4670298 h 6858000"/>
+              <a:gd name="connsiteX33" fmla="*/ 7611104 w 7809954"/>
+              <a:gd name="connsiteY33" fmla="*/ 4908956 h 6858000"/>
+              <a:gd name="connsiteX34" fmla="*/ 7625896 w 7809954"/>
+              <a:gd name="connsiteY34" fmla="*/ 5138013 h 6858000"/>
+              <a:gd name="connsiteX35" fmla="*/ 7642201 w 7809954"/>
+              <a:gd name="connsiteY35" fmla="*/ 5354726 h 6858000"/>
+              <a:gd name="connsiteX36" fmla="*/ 7659178 w 7809954"/>
+              <a:gd name="connsiteY36" fmla="*/ 5561838 h 6858000"/>
+              <a:gd name="connsiteX37" fmla="*/ 7677499 w 7809954"/>
+              <a:gd name="connsiteY37" fmla="*/ 5753862 h 6858000"/>
+              <a:gd name="connsiteX38" fmla="*/ 7695485 w 7809954"/>
+              <a:gd name="connsiteY38" fmla="*/ 5934227 h 6858000"/>
+              <a:gd name="connsiteX39" fmla="*/ 7713470 w 7809954"/>
+              <a:gd name="connsiteY39" fmla="*/ 6100191 h 6858000"/>
+              <a:gd name="connsiteX40" fmla="*/ 7730447 w 7809954"/>
+              <a:gd name="connsiteY40" fmla="*/ 6252438 h 6858000"/>
+              <a:gd name="connsiteX41" fmla="*/ 7746584 w 7809954"/>
+              <a:gd name="connsiteY41" fmla="*/ 6387541 h 6858000"/>
+              <a:gd name="connsiteX42" fmla="*/ 7761880 w 7809954"/>
+              <a:gd name="connsiteY42" fmla="*/ 6509613 h 6858000"/>
+              <a:gd name="connsiteX43" fmla="*/ 7774655 w 7809954"/>
+              <a:gd name="connsiteY43" fmla="*/ 6612483 h 6858000"/>
+              <a:gd name="connsiteX44" fmla="*/ 7786757 w 7809954"/>
+              <a:gd name="connsiteY44" fmla="*/ 6698894 h 6858000"/>
+              <a:gd name="connsiteX45" fmla="*/ 7804071 w 7809954"/>
+              <a:gd name="connsiteY45" fmla="*/ 6817538 h 6858000"/>
+              <a:gd name="connsiteX46" fmla="*/ 7809954 w 7809954"/>
+              <a:gd name="connsiteY46" fmla="*/ 6858000 h 6858000"/>
+              <a:gd name="connsiteX47" fmla="*/ 7157124 w 7809954"/>
+              <a:gd name="connsiteY47" fmla="*/ 6858000 h 6858000"/>
+              <a:gd name="connsiteX48" fmla="*/ 7157124 w 7809954"/>
+              <a:gd name="connsiteY48" fmla="*/ 6858000 h 6858000"/>
+              <a:gd name="connsiteX49" fmla="*/ 0 w 7809954"/>
+              <a:gd name="connsiteY49" fmla="*/ 6858000 h 6858000"/>
+              <a:gd name="connsiteX50" fmla="*/ 0 w 7809954"/>
+              <a:gd name="connsiteY50" fmla="*/ 0 h 6858000"/>
+              <a:gd name="connsiteX51" fmla="*/ 6465239 w 7809954"/>
+              <a:gd name="connsiteY51" fmla="*/ 0 h 6858000"/>
+            </a:gdLst>
+            <a:ahLst/>
+            <a:cxnLst>
+              <a:cxn ang="0">
+                <a:pos x="connsiteX0" y="connsiteY0"/>
+              </a:cxn>
+              <a:cxn ang="0">
+                <a:pos x="connsiteX1" y="connsiteY1"/>
+              </a:cxn>
+              <a:cxn ang="0">
+                <a:pos x="connsiteX2" y="connsiteY2"/>
+              </a:cxn>
+              <a:cxn ang="0">
+                <a:pos x="connsiteX3" y="connsiteY3"/>
+              </a:cxn>
+              <a:cxn ang="0">
+                <a:pos x="connsiteX4" y="connsiteY4"/>
+              </a:cxn>
+              <a:cxn ang="0">
+                <a:pos x="connsiteX5" y="connsiteY5"/>
+              </a:cxn>
+              <a:cxn ang="0">
+                <a:pos x="connsiteX6" y="connsiteY6"/>
+              </a:cxn>
+              <a:cxn ang="0">
+                <a:pos x="connsiteX7" y="connsiteY7"/>
+              </a:cxn>
+              <a:cxn ang="0">
+                <a:pos x="connsiteX8" y="connsiteY8"/>
+              </a:cxn>
+              <a:cxn ang="0">
+                <a:pos x="connsiteX9" y="connsiteY9"/>
+              </a:cxn>
+              <a:cxn ang="0">
+                <a:pos x="connsiteX10" y="connsiteY10"/>
+              </a:cxn>
+              <a:cxn ang="0">
+                <a:pos x="connsiteX11" y="connsiteY11"/>
+              </a:cxn>
+              <a:cxn ang="0">
+                <a:pos x="connsiteX12" y="connsiteY12"/>
+              </a:cxn>
+              <a:cxn ang="0">
+                <a:pos x="connsiteX13" y="connsiteY13"/>
+              </a:cxn>
+              <a:cxn ang="0">
+                <a:pos x="connsiteX14" y="connsiteY14"/>
+              </a:cxn>
+              <a:cxn ang="0">
+                <a:pos x="connsiteX15" y="connsiteY15"/>
+              </a:cxn>
+              <a:cxn ang="0">
+                <a:pos x="connsiteX16" y="connsiteY16"/>
+              </a:cxn>
+              <a:cxn ang="0">
+                <a:pos x="connsiteX17" y="connsiteY17"/>
+              </a:cxn>
+              <a:cxn ang="0">
+                <a:pos x="connsiteX18" y="connsiteY18"/>
+              </a:cxn>
+              <a:cxn ang="0">
+                <a:pos x="connsiteX19" y="connsiteY19"/>
+              </a:cxn>
+              <a:cxn ang="0">
+                <a:pos x="connsiteX20" y="connsiteY20"/>
+              </a:cxn>
+              <a:cxn ang="0">
+                <a:pos x="connsiteX21" y="connsiteY21"/>
+              </a:cxn>
+              <a:cxn ang="0">
+                <a:pos x="connsiteX22" y="connsiteY22"/>
+              </a:cxn>
+              <a:cxn ang="0">
+                <a:pos x="connsiteX23" y="connsiteY23"/>
+              </a:cxn>
+              <a:cxn ang="0">
+                <a:pos x="connsiteX24" y="connsiteY24"/>
+              </a:cxn>
+              <a:cxn ang="0">
+                <a:pos x="connsiteX25" y="connsiteY25"/>
+              </a:cxn>
+              <a:cxn ang="0">
+                <a:pos x="connsiteX26" y="connsiteY26"/>
+              </a:cxn>
+              <a:cxn ang="0">
+                <a:pos x="connsiteX27" y="connsiteY27"/>
+              </a:cxn>
+              <a:cxn ang="0">
+                <a:pos x="connsiteX28" y="connsiteY28"/>
+              </a:cxn>
+              <a:cxn ang="0">
+                <a:pos x="connsiteX29" y="connsiteY29"/>
+              </a:cxn>
+              <a:cxn ang="0">
+                <a:pos x="connsiteX30" y="connsiteY30"/>
+              </a:cxn>
+              <a:cxn ang="0">
+                <a:pos x="connsiteX31" y="connsiteY31"/>
+              </a:cxn>
+              <a:cxn ang="0">
+                <a:pos x="connsiteX32" y="connsiteY32"/>
+              </a:cxn>
+              <a:cxn ang="0">
+                <a:pos x="connsiteX33" y="connsiteY33"/>
+              </a:cxn>
+              <a:cxn ang="0">
+                <a:pos x="connsiteX34" y="connsiteY34"/>
+              </a:cxn>
+              <a:cxn ang="0">
+                <a:pos x="connsiteX35" y="connsiteY35"/>
+              </a:cxn>
+              <a:cxn ang="0">
+                <a:pos x="connsiteX36" y="connsiteY36"/>
+              </a:cxn>
+              <a:cxn ang="0">
+                <a:pos x="connsiteX37" y="connsiteY37"/>
+              </a:cxn>
+              <a:cxn ang="0">
+                <a:pos x="connsiteX38" y="connsiteY38"/>
+              </a:cxn>
+              <a:cxn ang="0">
+                <a:pos x="connsiteX39" y="connsiteY39"/>
+              </a:cxn>
+              <a:cxn ang="0">
+                <a:pos x="connsiteX40" y="connsiteY40"/>
+              </a:cxn>
+              <a:cxn ang="0">
+                <a:pos x="connsiteX41" y="connsiteY41"/>
+              </a:cxn>
+              <a:cxn ang="0">
+                <a:pos x="connsiteX42" y="connsiteY42"/>
+              </a:cxn>
+              <a:cxn ang="0">
+                <a:pos x="connsiteX43" y="connsiteY43"/>
+              </a:cxn>
+              <a:cxn ang="0">
+                <a:pos x="connsiteX44" y="connsiteY44"/>
+              </a:cxn>
+              <a:cxn ang="0">
+                <a:pos x="connsiteX45" y="connsiteY45"/>
+              </a:cxn>
+              <a:cxn ang="0">
+                <a:pos x="connsiteX46" y="connsiteY46"/>
+              </a:cxn>
+              <a:cxn ang="0">
+                <a:pos x="connsiteX47" y="connsiteY47"/>
+              </a:cxn>
+              <a:cxn ang="0">
+                <a:pos x="connsiteX48" y="connsiteY48"/>
+              </a:cxn>
+              <a:cxn ang="0">
+                <a:pos x="connsiteX49" y="connsiteY49"/>
+              </a:cxn>
+              <a:cxn ang="0">
+                <a:pos x="connsiteX50" y="connsiteY50"/>
+              </a:cxn>
+              <a:cxn ang="0">
+                <a:pos x="connsiteX51" y="connsiteY51"/>
+              </a:cxn>
+            </a:cxnLst>
+            <a:rect l="l" t="t" r="r" b="b"/>
+            <a:pathLst>
+              <a:path w="7809954" h="6858000">
+                <a:moveTo>
+                  <a:pt x="6465239" y="0"/>
+                </a:moveTo>
+                <a:lnTo>
+                  <a:pt x="7808777" y="0"/>
+                </a:lnTo>
+                <a:lnTo>
+                  <a:pt x="7783732" y="155676"/>
+                </a:lnTo>
+                <a:lnTo>
+                  <a:pt x="7759863" y="310667"/>
+                </a:lnTo>
+                <a:lnTo>
+                  <a:pt x="7736499" y="466344"/>
+                </a:lnTo>
+                <a:lnTo>
+                  <a:pt x="7716496" y="622706"/>
+                </a:lnTo>
+                <a:lnTo>
+                  <a:pt x="7696325" y="778383"/>
+                </a:lnTo>
+                <a:lnTo>
+                  <a:pt x="7677499" y="934745"/>
+                </a:lnTo>
+                <a:lnTo>
+                  <a:pt x="7661363" y="1089050"/>
+                </a:lnTo>
+                <a:lnTo>
+                  <a:pt x="7646067" y="1245413"/>
+                </a:lnTo>
+                <a:lnTo>
+                  <a:pt x="7632115" y="1401089"/>
+                </a:lnTo>
+                <a:lnTo>
+                  <a:pt x="7620013" y="1554023"/>
+                </a:lnTo>
+                <a:lnTo>
+                  <a:pt x="7607910" y="1709013"/>
+                </a:lnTo>
+                <a:lnTo>
+                  <a:pt x="7597825" y="1861947"/>
+                </a:lnTo>
+                <a:lnTo>
+                  <a:pt x="7589925" y="2014880"/>
+                </a:lnTo>
+                <a:lnTo>
+                  <a:pt x="7581688" y="2167128"/>
+                </a:lnTo>
+                <a:lnTo>
+                  <a:pt x="7574797" y="2318004"/>
+                </a:lnTo>
+                <a:lnTo>
+                  <a:pt x="7569922" y="2467508"/>
+                </a:lnTo>
+                <a:lnTo>
+                  <a:pt x="7565720" y="2617013"/>
+                </a:lnTo>
+                <a:lnTo>
+                  <a:pt x="7561686" y="2765145"/>
+                </a:lnTo>
+                <a:lnTo>
+                  <a:pt x="7559837" y="2911221"/>
+                </a:lnTo>
+                <a:lnTo>
+                  <a:pt x="7557820" y="3057296"/>
+                </a:lnTo>
+                <a:lnTo>
+                  <a:pt x="7556811" y="3201314"/>
+                </a:lnTo>
+                <a:lnTo>
+                  <a:pt x="7557820" y="3343960"/>
+                </a:lnTo>
+                <a:lnTo>
+                  <a:pt x="7557820" y="3485235"/>
+                </a:lnTo>
+                <a:lnTo>
+                  <a:pt x="7559837" y="3625138"/>
+                </a:lnTo>
+                <a:lnTo>
+                  <a:pt x="7562862" y="3762298"/>
+                </a:lnTo>
+                <a:lnTo>
+                  <a:pt x="7565720" y="3898087"/>
+                </a:lnTo>
+                <a:lnTo>
+                  <a:pt x="7568914" y="4031132"/>
+                </a:lnTo>
+                <a:lnTo>
+                  <a:pt x="7573788" y="4163491"/>
+                </a:lnTo>
+                <a:lnTo>
+                  <a:pt x="7578999" y="4293793"/>
+                </a:lnTo>
+                <a:lnTo>
+                  <a:pt x="7583705" y="4421352"/>
+                </a:lnTo>
+                <a:lnTo>
+                  <a:pt x="7596985" y="4670298"/>
+                </a:lnTo>
+                <a:lnTo>
+                  <a:pt x="7611104" y="4908956"/>
+                </a:lnTo>
+                <a:lnTo>
+                  <a:pt x="7625896" y="5138013"/>
+                </a:lnTo>
+                <a:lnTo>
+                  <a:pt x="7642201" y="5354726"/>
+                </a:lnTo>
+                <a:lnTo>
+                  <a:pt x="7659178" y="5561838"/>
+                </a:lnTo>
+                <a:lnTo>
+                  <a:pt x="7677499" y="5753862"/>
+                </a:lnTo>
+                <a:lnTo>
+                  <a:pt x="7695485" y="5934227"/>
+                </a:lnTo>
+                <a:lnTo>
+                  <a:pt x="7713470" y="6100191"/>
+                </a:lnTo>
+                <a:lnTo>
+                  <a:pt x="7730447" y="6252438"/>
+                </a:lnTo>
+                <a:lnTo>
+                  <a:pt x="7746584" y="6387541"/>
+                </a:lnTo>
+                <a:lnTo>
+                  <a:pt x="7761880" y="6509613"/>
+                </a:lnTo>
+                <a:lnTo>
+                  <a:pt x="7774655" y="6612483"/>
+                </a:lnTo>
+                <a:lnTo>
+                  <a:pt x="7786757" y="6698894"/>
+                </a:lnTo>
+                <a:lnTo>
+                  <a:pt x="7804071" y="6817538"/>
+                </a:lnTo>
+                <a:lnTo>
+                  <a:pt x="7809954" y="6858000"/>
+                </a:lnTo>
+                <a:lnTo>
+                  <a:pt x="7157124" y="6858000"/>
+                </a:lnTo>
+                <a:lnTo>
+                  <a:pt x="7157124" y="6858000"/>
+                </a:lnTo>
+                <a:lnTo>
+                  <a:pt x="0" y="6858000"/>
+                </a:lnTo>
+                <a:lnTo>
+                  <a:pt x="0" y="0"/>
+                </a:lnTo>
+                <a:lnTo>
+                  <a:pt x="6465239" y="0"/>
+                </a:lnTo>
+                <a:close/>
+              </a:path>
+            </a:pathLst>
+          </a:custGeom>
+          <a:ln>
+            <a:noFill/>
+          </a:ln>
+        </p:spPr>
+        <p:style>
+          <a:lnRef idx="2">
+            <a:schemeClr val="accent1">
+              <a:shade val="50000"/>
+            </a:schemeClr>
+          </a:lnRef>
+          <a:fillRef idx="1">
+            <a:schemeClr val="accent1"/>
+          </a:fillRef>
+          <a:effectRef idx="0">
+            <a:schemeClr val="accent1"/>
+          </a:effectRef>
+          <a:fontRef idx="minor">
+            <a:schemeClr val="lt1"/>
+          </a:fontRef>
+        </p:style>
+        <p:txBody>
+          <a:bodyPr wrap="square" rtlCol="0" anchor="ctr">
+            <a:noAutofit/>
+          </a:bodyPr>
+          <a:lstStyle/>
+          <a:p>
+            <a:pPr algn="ctr"/>
+            <a:endParaRPr lang="en-US"/>
+          </a:p>
+        </p:txBody>
+      </p:sp>
+      <p:sp>
+        <p:nvSpPr>
+          <p:cNvPr id="29" name="Rectangle 28">
+            <a:extLst>
+              <a:ext uri="{FF2B5EF4-FFF2-40B4-BE49-F238E27FC236}">
+                <a16:creationId xmlns:a16="http://schemas.microsoft.com/office/drawing/2014/main" id="{F98810A7-E114-447A-A7D6-69B27CFB5650}"/>
+              </a:ext>
+              <a:ext uri="{C183D7F6-B498-43B3-948B-1728B52AA6E4}">
+                <adec:decorative xmlns:adec="http://schemas.microsoft.com/office/drawing/2017/decorative" val="1"/>
+              </a:ext>
+            </a:extLst>
+          </p:cNvPr>
+          <p:cNvSpPr>
+            <a:spLocks noGrp="1" noRot="1" noChangeAspect="1" noMove="1" noResize="1" noEditPoints="1" noAdjustHandles="1" noChangeArrowheads="1" noChangeShapeType="1" noTextEdit="1"/>
+          </p:cNvSpPr>
+          <p:nvPr>
+            <p:extLst>
+              <p:ext uri="{386F3935-93C4-4BCD-93E2-E3B085C9AB24}">
+                <p16:designElem xmlns:p16="http://schemas.microsoft.com/office/powerpoint/2015/main" val="1"/>
+              </p:ext>
+            </p:extLst>
+          </p:nvPr>
+        </p:nvSpPr>
+        <p:spPr>
+          <a:xfrm>
+            <a:off x="10437812" y="0"/>
+            <a:ext cx="685800" cy="1143000"/>
+          </a:xfrm>
+          <a:prstGeom prst="rect">
+            <a:avLst/>
+          </a:prstGeom>
+          <a:solidFill>
+            <a:schemeClr val="accent1"/>
+          </a:solidFill>
+          <a:ln>
+            <a:noFill/>
+          </a:ln>
+        </p:spPr>
+        <p:style>
+          <a:lnRef idx="1">
+            <a:schemeClr val="accent1"/>
+          </a:lnRef>
+          <a:fillRef idx="3">
+            <a:schemeClr val="accent1"/>
+          </a:fillRef>
+          <a:effectRef idx="2">
+            <a:schemeClr val="accent1"/>
+          </a:effectRef>
+          <a:fontRef idx="minor">
+            <a:schemeClr val="lt1"/>
+          </a:fontRef>
+        </p:style>
+      </p:sp>
+      <p:pic>
+        <p:nvPicPr>
+          <p:cNvPr id="6" name="Content Placeholder 5" descr="A picture containing text, clothing&#10;&#10;Description automatically generated">
+            <a:extLst>
+              <a:ext uri="{FF2B5EF4-FFF2-40B4-BE49-F238E27FC236}">
+                <a16:creationId xmlns:a16="http://schemas.microsoft.com/office/drawing/2014/main" id="{E2ADC0A8-386B-6A48-9BFF-328BD4298BC6}"/>
+              </a:ext>
+            </a:extLst>
+          </p:cNvPr>
+          <p:cNvPicPr>
+            <a:picLocks noGrp="1" noChangeAspect="1"/>
+          </p:cNvPicPr>
+          <p:nvPr>
+            <p:ph idx="1"/>
+          </p:nvPr>
+        </p:nvPicPr>
+        <p:blipFill>
+          <a:blip r:embed="rId6"/>
+          <a:stretch>
+            <a:fillRect/>
+          </a:stretch>
+        </p:blipFill>
+        <p:spPr>
+          <a:xfrm>
+            <a:off x="404925" y="1453359"/>
+            <a:ext cx="6812553" cy="3951281"/>
+          </a:xfrm>
+          <a:prstGeom prst="rect">
+            <a:avLst/>
+          </a:prstGeom>
+          <a:effectLst/>
+        </p:spPr>
+      </p:pic>
+    </p:spTree>
+    <p:extLst>
+      <p:ext uri="{BB962C8B-B14F-4D97-AF65-F5344CB8AC3E}">
+        <p14:creationId xmlns:p14="http://schemas.microsoft.com/office/powerpoint/2010/main" val="2364654880"/>
+      </p:ext>
+    </p:extLst>
+  </p:cSld>
+  <p:clrMapOvr>
+    <a:overrideClrMapping bg1="lt1" tx1="dk1" bg2="lt2" tx2="dk2" accent1="accent1" accent2="accent2" accent3="accent3" accent4="accent4" accent5="accent5" accent6="accent6" hlink="hlink" folHlink="folHlink"/>
+  </p:clrMapOvr>
+</p:sld>
+</file>
+
+<file path=ppt/slides/slide5.xml><?xml version="1.0" encoding="utf-8"?>
+<p:sld xmlns:a="http://schemas.openxmlformats.org/drawingml/2006/main" xmlns:r="http://schemas.openxmlformats.org/officeDocument/2006/relationships" xmlns:p="http://schemas.openxmlformats.org/presentationml/2006/main">
+  <p:cSld>
     <p:spTree>
       <p:nvGrpSpPr>
         <p:cNvPr id="1" name=""/>
@@ -15681,7 +17093,7 @@
           <p:cNvPr id="2" name="Title 1">
             <a:extLst>
               <a:ext uri="{FF2B5EF4-FFF2-40B4-BE49-F238E27FC236}">
-                <a16:creationId xmlns:a16="http://schemas.microsoft.com/office/drawing/2014/main" id="{A6F5B8DB-E45A-614F-AC13-C19C2287C4BF}"/>
+                <a16:creationId xmlns:a16="http://schemas.microsoft.com/office/drawing/2014/main" id="{368CAF61-52D7-6948-BAC2-8DCF10A15161}"/>
               </a:ext>
             </a:extLst>
           </p:cNvPr>
@@ -15699,44 +17111,96 @@
           <a:p>
             <a:r>
               <a:rPr lang="en-US" dirty="0"/>
-              <a:t>Private Shelters, Visualized</a:t>
+              <a:t>Future Enhancements</a:t>
             </a:r>
           </a:p>
         </p:txBody>
       </p:sp>
-      <p:pic>
-        <p:nvPicPr>
-          <p:cNvPr id="7" name="Content Placeholder 6">
+      <p:sp>
+        <p:nvSpPr>
+          <p:cNvPr id="3" name="Content Placeholder 2">
             <a:extLst>
               <a:ext uri="{FF2B5EF4-FFF2-40B4-BE49-F238E27FC236}">
-                <a16:creationId xmlns:a16="http://schemas.microsoft.com/office/drawing/2014/main" id="{A7005CE3-62CD-F54A-83AD-2C290AA51814}"/>
+                <a16:creationId xmlns:a16="http://schemas.microsoft.com/office/drawing/2014/main" id="{C228E451-46A9-6246-B9B8-80432368D8A2}"/>
               </a:ext>
             </a:extLst>
           </p:cNvPr>
-          <p:cNvPicPr>
-            <a:picLocks noGrp="1" noChangeAspect="1"/>
-          </p:cNvPicPr>
+          <p:cNvSpPr>
+            <a:spLocks noGrp="1"/>
+          </p:cNvSpPr>
           <p:nvPr>
             <p:ph idx="1"/>
           </p:nvPr>
-        </p:nvPicPr>
-        <p:blipFill>
-          <a:blip r:embed="rId2"/>
-          <a:stretch>
-            <a:fillRect/>
-          </a:stretch>
-        </p:blipFill>
+        </p:nvSpPr>
         <p:spPr>
           <a:xfrm>
-            <a:off x="2141166" y="1693798"/>
-            <a:ext cx="7315200" cy="4711484"/>
+            <a:off x="1103312" y="1615858"/>
+            <a:ext cx="8946541" cy="4632541"/>
           </a:xfrm>
         </p:spPr>
-      </p:pic>
+        <p:txBody>
+          <a:bodyPr/>
+          <a:lstStyle/>
+          <a:p>
+            <a:pPr marL="0" indent="0">
+              <a:buNone/>
+            </a:pPr>
+            <a:r>
+              <a:rPr lang="en-US" dirty="0"/>
+              <a:t>Residents:</a:t>
+            </a:r>
+          </a:p>
+          <a:p>
+            <a:r>
+              <a:rPr lang="en-US" dirty="0"/>
+              <a:t>Enable residents to document the condition of their residence before and after the disaster</a:t>
+            </a:r>
+          </a:p>
+          <a:p>
+            <a:r>
+              <a:rPr lang="en-US" dirty="0"/>
+              <a:t>Report an issue</a:t>
+            </a:r>
+          </a:p>
+          <a:p>
+            <a:r>
+              <a:rPr lang="en-US" dirty="0"/>
+              <a:t>Allow people to respond with their updates via SMS</a:t>
+            </a:r>
+          </a:p>
+          <a:p>
+            <a:pPr marL="0" indent="0">
+              <a:buNone/>
+            </a:pPr>
+            <a:endParaRPr lang="en-US" dirty="0"/>
+          </a:p>
+          <a:p>
+            <a:pPr marL="0" indent="0">
+              <a:buNone/>
+            </a:pPr>
+            <a:r>
+              <a:rPr lang="en-US" dirty="0"/>
+              <a:t>Government:</a:t>
+            </a:r>
+          </a:p>
+          <a:p>
+            <a:r>
+              <a:rPr lang="en-US" dirty="0"/>
+              <a:t>Leverage property records to predict the resilience of each house based on forecast data</a:t>
+            </a:r>
+          </a:p>
+          <a:p>
+            <a:r>
+              <a:rPr lang="en-US" dirty="0"/>
+              <a:t>Expose data about pre-storm supply levels to local retailers</a:t>
+            </a:r>
+          </a:p>
+        </p:txBody>
+      </p:sp>
     </p:spTree>
     <p:extLst>
       <p:ext uri="{BB962C8B-B14F-4D97-AF65-F5344CB8AC3E}">
-        <p14:creationId xmlns:p14="http://schemas.microsoft.com/office/powerpoint/2010/main" val="2364654880"/>
+        <p14:creationId xmlns:p14="http://schemas.microsoft.com/office/powerpoint/2010/main" val="1662598060"/>
       </p:ext>
     </p:extLst>
   </p:cSld>

</xml_diff>